<commit_message>
Fixed problems at slide 2.12 in Slide_2_2.pptx
</commit_message>
<xml_diff>
--- a/Slides/Day_2_2.pptx
+++ b/Slides/Day_2_2.pptx
@@ -29,32 +29,31 @@
     <p:sldId id="277" r:id="rId23"/>
     <p:sldId id="282" r:id="rId24"/>
     <p:sldId id="278" r:id="rId25"/>
-    <p:sldId id="279" r:id="rId26"/>
-    <p:sldId id="280" r:id="rId27"/>
-    <p:sldId id="281" r:id="rId28"/>
-    <p:sldId id="283" r:id="rId29"/>
-    <p:sldId id="284" r:id="rId30"/>
-    <p:sldId id="285" r:id="rId31"/>
-    <p:sldId id="286" r:id="rId32"/>
-    <p:sldId id="287" r:id="rId33"/>
-    <p:sldId id="288" r:id="rId34"/>
-    <p:sldId id="289" r:id="rId35"/>
-    <p:sldId id="290" r:id="rId36"/>
-    <p:sldId id="291" r:id="rId37"/>
-    <p:sldId id="292" r:id="rId38"/>
-    <p:sldId id="293" r:id="rId39"/>
-    <p:sldId id="294" r:id="rId40"/>
-    <p:sldId id="295" r:id="rId41"/>
-    <p:sldId id="296" r:id="rId42"/>
-    <p:sldId id="297" r:id="rId43"/>
-    <p:sldId id="298" r:id="rId44"/>
-    <p:sldId id="299" r:id="rId45"/>
-    <p:sldId id="300" r:id="rId46"/>
-    <p:sldId id="301" r:id="rId47"/>
-    <p:sldId id="302" r:id="rId48"/>
-    <p:sldId id="303" r:id="rId49"/>
-    <p:sldId id="304" r:id="rId50"/>
-    <p:sldId id="305" r:id="rId51"/>
+    <p:sldId id="306" r:id="rId26"/>
+    <p:sldId id="281" r:id="rId27"/>
+    <p:sldId id="283" r:id="rId28"/>
+    <p:sldId id="284" r:id="rId29"/>
+    <p:sldId id="285" r:id="rId30"/>
+    <p:sldId id="286" r:id="rId31"/>
+    <p:sldId id="287" r:id="rId32"/>
+    <p:sldId id="288" r:id="rId33"/>
+    <p:sldId id="289" r:id="rId34"/>
+    <p:sldId id="290" r:id="rId35"/>
+    <p:sldId id="291" r:id="rId36"/>
+    <p:sldId id="292" r:id="rId37"/>
+    <p:sldId id="293" r:id="rId38"/>
+    <p:sldId id="294" r:id="rId39"/>
+    <p:sldId id="295" r:id="rId40"/>
+    <p:sldId id="296" r:id="rId41"/>
+    <p:sldId id="297" r:id="rId42"/>
+    <p:sldId id="298" r:id="rId43"/>
+    <p:sldId id="299" r:id="rId44"/>
+    <p:sldId id="300" r:id="rId45"/>
+    <p:sldId id="301" r:id="rId46"/>
+    <p:sldId id="302" r:id="rId47"/>
+    <p:sldId id="303" r:id="rId48"/>
+    <p:sldId id="304" r:id="rId49"/>
+    <p:sldId id="305" r:id="rId50"/>
   </p:sldIdLst>
   <p:sldSz cx="12192000" cy="6858000"/>
   <p:notesSz cx="6858000" cy="9144000"/>
@@ -347,7 +346,7 @@
           <a:p>
             <a:fld id="{EDA8BDCB-78B0-4602-A2A4-46193FA57CAD}" type="datetimeFigureOut">
               <a:rPr lang="en-US" smtClean="0"/>
-              <a:t>7/17/2024</a:t>
+              <a:t>7/19/2024</a:t>
             </a:fld>
             <a:endParaRPr lang="en-US"/>
           </a:p>
@@ -621,7 +620,7 @@
           <a:p>
             <a:fld id="{EDA8BDCB-78B0-4602-A2A4-46193FA57CAD}" type="datetimeFigureOut">
               <a:rPr lang="en-US" smtClean="0"/>
-              <a:t>7/17/2024</a:t>
+              <a:t>7/19/2024</a:t>
             </a:fld>
             <a:endParaRPr lang="en-US"/>
           </a:p>
@@ -815,7 +814,7 @@
           <a:p>
             <a:fld id="{EDA8BDCB-78B0-4602-A2A4-46193FA57CAD}" type="datetimeFigureOut">
               <a:rPr lang="en-US" smtClean="0"/>
-              <a:t>7/17/2024</a:t>
+              <a:t>7/19/2024</a:t>
             </a:fld>
             <a:endParaRPr lang="en-US"/>
           </a:p>
@@ -1088,7 +1087,7 @@
           <a:p>
             <a:fld id="{EDA8BDCB-78B0-4602-A2A4-46193FA57CAD}" type="datetimeFigureOut">
               <a:rPr lang="en-US" smtClean="0"/>
-              <a:t>7/17/2024</a:t>
+              <a:t>7/19/2024</a:t>
             </a:fld>
             <a:endParaRPr lang="en-US"/>
           </a:p>
@@ -1429,7 +1428,7 @@
           <a:p>
             <a:fld id="{EDA8BDCB-78B0-4602-A2A4-46193FA57CAD}" type="datetimeFigureOut">
               <a:rPr lang="en-US" smtClean="0"/>
-              <a:t>7/17/2024</a:t>
+              <a:t>7/19/2024</a:t>
             </a:fld>
             <a:endParaRPr lang="en-US"/>
           </a:p>
@@ -2052,7 +2051,7 @@
           <a:p>
             <a:fld id="{EDA8BDCB-78B0-4602-A2A4-46193FA57CAD}" type="datetimeFigureOut">
               <a:rPr lang="en-US" smtClean="0"/>
-              <a:t>7/17/2024</a:t>
+              <a:t>7/19/2024</a:t>
             </a:fld>
             <a:endParaRPr lang="en-US"/>
           </a:p>
@@ -2909,7 +2908,7 @@
           <a:p>
             <a:fld id="{EDA8BDCB-78B0-4602-A2A4-46193FA57CAD}" type="datetimeFigureOut">
               <a:rPr lang="en-US" smtClean="0"/>
-              <a:t>7/17/2024</a:t>
+              <a:t>7/19/2024</a:t>
             </a:fld>
             <a:endParaRPr lang="en-US"/>
           </a:p>
@@ -3079,7 +3078,7 @@
           <a:p>
             <a:fld id="{EDA8BDCB-78B0-4602-A2A4-46193FA57CAD}" type="datetimeFigureOut">
               <a:rPr lang="en-US" smtClean="0"/>
-              <a:t>7/17/2024</a:t>
+              <a:t>7/19/2024</a:t>
             </a:fld>
             <a:endParaRPr lang="en-US"/>
           </a:p>
@@ -3259,7 +3258,7 @@
           <a:p>
             <a:fld id="{EDA8BDCB-78B0-4602-A2A4-46193FA57CAD}" type="datetimeFigureOut">
               <a:rPr lang="en-US" smtClean="0"/>
-              <a:t>7/17/2024</a:t>
+              <a:t>7/19/2024</a:t>
             </a:fld>
             <a:endParaRPr lang="en-US"/>
           </a:p>
@@ -3429,7 +3428,7 @@
           <a:p>
             <a:fld id="{EDA8BDCB-78B0-4602-A2A4-46193FA57CAD}" type="datetimeFigureOut">
               <a:rPr lang="en-US" smtClean="0"/>
-              <a:t>7/17/2024</a:t>
+              <a:t>7/19/2024</a:t>
             </a:fld>
             <a:endParaRPr lang="en-US"/>
           </a:p>
@@ -3676,7 +3675,7 @@
           <a:p>
             <a:fld id="{EDA8BDCB-78B0-4602-A2A4-46193FA57CAD}" type="datetimeFigureOut">
               <a:rPr lang="en-US" smtClean="0"/>
-              <a:t>7/17/2024</a:t>
+              <a:t>7/19/2024</a:t>
             </a:fld>
             <a:endParaRPr lang="en-US"/>
           </a:p>
@@ -3968,7 +3967,7 @@
           <a:p>
             <a:fld id="{EDA8BDCB-78B0-4602-A2A4-46193FA57CAD}" type="datetimeFigureOut">
               <a:rPr lang="en-US" smtClean="0"/>
-              <a:t>7/17/2024</a:t>
+              <a:t>7/19/2024</a:t>
             </a:fld>
             <a:endParaRPr lang="en-US"/>
           </a:p>
@@ -4412,7 +4411,7 @@
           <a:p>
             <a:fld id="{EDA8BDCB-78B0-4602-A2A4-46193FA57CAD}" type="datetimeFigureOut">
               <a:rPr lang="en-US" smtClean="0"/>
-              <a:t>7/17/2024</a:t>
+              <a:t>7/19/2024</a:t>
             </a:fld>
             <a:endParaRPr lang="en-US"/>
           </a:p>
@@ -4530,7 +4529,7 @@
           <a:p>
             <a:fld id="{EDA8BDCB-78B0-4602-A2A4-46193FA57CAD}" type="datetimeFigureOut">
               <a:rPr lang="en-US" smtClean="0"/>
-              <a:t>7/17/2024</a:t>
+              <a:t>7/19/2024</a:t>
             </a:fld>
             <a:endParaRPr lang="en-US"/>
           </a:p>
@@ -4625,7 +4624,7 @@
           <a:p>
             <a:fld id="{EDA8BDCB-78B0-4602-A2A4-46193FA57CAD}" type="datetimeFigureOut">
               <a:rPr lang="en-US" smtClean="0"/>
-              <a:t>7/17/2024</a:t>
+              <a:t>7/19/2024</a:t>
             </a:fld>
             <a:endParaRPr lang="en-US"/>
           </a:p>
@@ -4904,7 +4903,7 @@
           <a:p>
             <a:fld id="{EDA8BDCB-78B0-4602-A2A4-46193FA57CAD}" type="datetimeFigureOut">
               <a:rPr lang="en-US" smtClean="0"/>
-              <a:t>7/17/2024</a:t>
+              <a:t>7/19/2024</a:t>
             </a:fld>
             <a:endParaRPr lang="en-US"/>
           </a:p>
@@ -5178,7 +5177,7 @@
           <a:p>
             <a:fld id="{EDA8BDCB-78B0-4602-A2A4-46193FA57CAD}" type="datetimeFigureOut">
               <a:rPr lang="en-US" smtClean="0"/>
-              <a:t>7/17/2024</a:t>
+              <a:t>7/19/2024</a:t>
             </a:fld>
             <a:endParaRPr lang="en-US"/>
           </a:p>
@@ -5607,7 +5606,7 @@
           <a:p>
             <a:fld id="{EDA8BDCB-78B0-4602-A2A4-46193FA57CAD}" type="datetimeFigureOut">
               <a:rPr lang="en-US" smtClean="0"/>
-              <a:t>7/17/2024</a:t>
+              <a:t>7/19/2024</a:t>
             </a:fld>
             <a:endParaRPr lang="en-US"/>
           </a:p>
@@ -8345,7 +8344,7 @@
                 <a:latin typeface="Arial" panose="020B0604020202020204" pitchFamily="34" charset="0"/>
                 <a:cs typeface="Arial" panose="020B0604020202020204" pitchFamily="34" charset="0"/>
               </a:rPr>
-              <a:t>replace: Thay thế chuỗi A1 đầu tiên được tìm thấy trong chuỗi A bằng chuỗi B.</a:t>
+              <a:t>replace: Thay thế tất cả chuỗi A1 được tìm thấy trong chuỗi A bằng chuỗi B.</a:t>
             </a:r>
           </a:p>
           <a:p>
@@ -8355,7 +8354,7 @@
                 <a:latin typeface="Arial" panose="020B0604020202020204" pitchFamily="34" charset="0"/>
                 <a:cs typeface="Arial" panose="020B0604020202020204" pitchFamily="34" charset="0"/>
               </a:rPr>
-              <a:t>replaceAll: Thay thế tất cả các chuỗi A1 được tìm thấy trong chuỗi A bằng chuỗi B.</a:t>
+              <a:t>replaceAll: Thay thế tất cả các chuỗi A1 khớp với biểu thức chính quy được đề ra trong chuỗi A bằng chuỗi B.</a:t>
             </a:r>
           </a:p>
           <a:p>
@@ -8436,7 +8435,7 @@
           <p:cNvPr id="7" name="Content Placeholder 6">
             <a:extLst>
               <a:ext uri="{FF2B5EF4-FFF2-40B4-BE49-F238E27FC236}">
-                <a16:creationId xmlns:a16="http://schemas.microsoft.com/office/drawing/2014/main" id="{078421E0-E757-4961-80D7-F0D285277DB4}"/>
+                <a16:creationId xmlns:a16="http://schemas.microsoft.com/office/drawing/2014/main" id="{43657830-E33B-4608-9DE1-58A1047F71C7}"/>
               </a:ext>
             </a:extLst>
           </p:cNvPr>
@@ -8455,15 +8454,15 @@
         </p:blipFill>
         <p:spPr>
           <a:xfrm>
-            <a:off x="1191026" y="2593507"/>
-            <a:ext cx="9809947" cy="3336776"/>
+            <a:off x="1496664" y="1955062"/>
+            <a:ext cx="9198672" cy="4259307"/>
           </a:xfrm>
         </p:spPr>
       </p:pic>
     </p:spTree>
     <p:extLst>
       <p:ext uri="{BB962C8B-B14F-4D97-AF65-F5344CB8AC3E}">
-        <p14:creationId xmlns:p14="http://schemas.microsoft.com/office/powerpoint/2010/main" val="2601215418"/>
+        <p14:creationId xmlns:p14="http://schemas.microsoft.com/office/powerpoint/2010/main" val="33053151"/>
       </p:ext>
     </p:extLst>
   </p:cSld>
@@ -8474,96 +8473,6 @@
 </file>
 
 <file path=ppt/slides/slide26.xml><?xml version="1.0" encoding="utf-8"?>
-<p:sld xmlns:a="http://schemas.openxmlformats.org/drawingml/2006/main" xmlns:r="http://schemas.openxmlformats.org/officeDocument/2006/relationships" xmlns:p="http://schemas.openxmlformats.org/presentationml/2006/main">
-  <p:cSld>
-    <p:spTree>
-      <p:nvGrpSpPr>
-        <p:cNvPr id="1" name=""/>
-        <p:cNvGrpSpPr/>
-        <p:nvPr/>
-      </p:nvGrpSpPr>
-      <p:grpSpPr>
-        <a:xfrm>
-          <a:off x="0" y="0"/>
-          <a:ext cx="0" cy="0"/>
-          <a:chOff x="0" y="0"/>
-          <a:chExt cx="0" cy="0"/>
-        </a:xfrm>
-      </p:grpSpPr>
-      <p:sp>
-        <p:nvSpPr>
-          <p:cNvPr id="2" name="Title 1">
-            <a:extLst>
-              <a:ext uri="{FF2B5EF4-FFF2-40B4-BE49-F238E27FC236}">
-                <a16:creationId xmlns:a16="http://schemas.microsoft.com/office/drawing/2014/main" id="{14D7F595-0D8F-4FE6-A3EC-4557A1A457EB}"/>
-              </a:ext>
-            </a:extLst>
-          </p:cNvPr>
-          <p:cNvSpPr>
-            <a:spLocks noGrp="1"/>
-          </p:cNvSpPr>
-          <p:nvPr>
-            <p:ph type="title"/>
-          </p:nvPr>
-        </p:nvSpPr>
-        <p:spPr/>
-        <p:txBody>
-          <a:bodyPr/>
-          <a:lstStyle/>
-          <a:p>
-            <a:r>
-              <a:rPr lang="en-US">
-                <a:latin typeface="Arial" panose="020B0604020202020204" pitchFamily="34" charset="0"/>
-                <a:cs typeface="Arial" panose="020B0604020202020204" pitchFamily="34" charset="0"/>
-              </a:rPr>
-              <a:t>2.12. Thay thế chuỗi</a:t>
-            </a:r>
-          </a:p>
-        </p:txBody>
-      </p:sp>
-      <p:pic>
-        <p:nvPicPr>
-          <p:cNvPr id="6" name="Content Placeholder 5">
-            <a:extLst>
-              <a:ext uri="{FF2B5EF4-FFF2-40B4-BE49-F238E27FC236}">
-                <a16:creationId xmlns:a16="http://schemas.microsoft.com/office/drawing/2014/main" id="{4AEE27A4-11FB-4896-B56E-074A16CC1C2D}"/>
-              </a:ext>
-            </a:extLst>
-          </p:cNvPr>
-          <p:cNvPicPr>
-            <a:picLocks noGrp="1" noChangeAspect="1"/>
-          </p:cNvPicPr>
-          <p:nvPr>
-            <p:ph idx="1"/>
-          </p:nvPr>
-        </p:nvPicPr>
-        <p:blipFill>
-          <a:blip r:embed="rId2"/>
-          <a:stretch>
-            <a:fillRect/>
-          </a:stretch>
-        </p:blipFill>
-        <p:spPr>
-          <a:xfrm>
-            <a:off x="1189481" y="3112813"/>
-            <a:ext cx="9813038" cy="2480120"/>
-          </a:xfrm>
-        </p:spPr>
-      </p:pic>
-    </p:spTree>
-    <p:extLst>
-      <p:ext uri="{BB962C8B-B14F-4D97-AF65-F5344CB8AC3E}">
-        <p14:creationId xmlns:p14="http://schemas.microsoft.com/office/powerpoint/2010/main" val="3473520040"/>
-      </p:ext>
-    </p:extLst>
-  </p:cSld>
-  <p:clrMapOvr>
-    <a:masterClrMapping/>
-  </p:clrMapOvr>
-</p:sld>
-</file>
-
-<file path=ppt/slides/slide27.xml><?xml version="1.0" encoding="utf-8"?>
 <p:sld xmlns:a="http://schemas.openxmlformats.org/drawingml/2006/main" xmlns:r="http://schemas.openxmlformats.org/officeDocument/2006/relationships" xmlns:p="http://schemas.openxmlformats.org/presentationml/2006/main">
   <p:cSld>
     <p:spTree>
@@ -8725,7 +8634,7 @@
 </p:sld>
 </file>
 
-<file path=ppt/slides/slide28.xml><?xml version="1.0" encoding="utf-8"?>
+<file path=ppt/slides/slide27.xml><?xml version="1.0" encoding="utf-8"?>
 <p:sld xmlns:a="http://schemas.openxmlformats.org/drawingml/2006/main" xmlns:r="http://schemas.openxmlformats.org/officeDocument/2006/relationships" xmlns:p="http://schemas.openxmlformats.org/presentationml/2006/main">
   <p:cSld>
     <p:spTree>
@@ -8847,7 +8756,7 @@
 </p:sld>
 </file>
 
-<file path=ppt/slides/slide29.xml><?xml version="1.0" encoding="utf-8"?>
+<file path=ppt/slides/slide28.xml><?xml version="1.0" encoding="utf-8"?>
 <p:sld xmlns:a="http://schemas.openxmlformats.org/drawingml/2006/main" xmlns:r="http://schemas.openxmlformats.org/officeDocument/2006/relationships" xmlns:p="http://schemas.openxmlformats.org/presentationml/2006/main">
   <p:cSld>
     <p:spTree>
@@ -8969,6 +8878,113 @@
 </p:sld>
 </file>
 
+<file path=ppt/slides/slide29.xml><?xml version="1.0" encoding="utf-8"?>
+<p:sld xmlns:a="http://schemas.openxmlformats.org/drawingml/2006/main" xmlns:r="http://schemas.openxmlformats.org/officeDocument/2006/relationships" xmlns:p="http://schemas.openxmlformats.org/presentationml/2006/main">
+  <p:cSld>
+    <p:spTree>
+      <p:nvGrpSpPr>
+        <p:cNvPr id="1" name=""/>
+        <p:cNvGrpSpPr/>
+        <p:nvPr/>
+      </p:nvGrpSpPr>
+      <p:grpSpPr>
+        <a:xfrm>
+          <a:off x="0" y="0"/>
+          <a:ext cx="0" cy="0"/>
+          <a:chOff x="0" y="0"/>
+          <a:chExt cx="0" cy="0"/>
+        </a:xfrm>
+      </p:grpSpPr>
+      <p:sp>
+        <p:nvSpPr>
+          <p:cNvPr id="2" name="Title 1">
+            <a:extLst>
+              <a:ext uri="{FF2B5EF4-FFF2-40B4-BE49-F238E27FC236}">
+                <a16:creationId xmlns:a16="http://schemas.microsoft.com/office/drawing/2014/main" id="{14D7F595-0D8F-4FE6-A3EC-4557A1A457EB}"/>
+              </a:ext>
+            </a:extLst>
+          </p:cNvPr>
+          <p:cNvSpPr>
+            <a:spLocks noGrp="1"/>
+          </p:cNvSpPr>
+          <p:nvPr>
+            <p:ph type="title"/>
+          </p:nvPr>
+        </p:nvSpPr>
+        <p:spPr/>
+        <p:txBody>
+          <a:bodyPr/>
+          <a:lstStyle/>
+          <a:p>
+            <a:r>
+              <a:rPr lang="en-US">
+                <a:latin typeface="Arial" panose="020B0604020202020204" pitchFamily="34" charset="0"/>
+                <a:cs typeface="Arial" panose="020B0604020202020204" pitchFamily="34" charset="0"/>
+              </a:rPr>
+              <a:t>Bài tập thực hành</a:t>
+            </a:r>
+          </a:p>
+        </p:txBody>
+      </p:sp>
+      <p:sp>
+        <p:nvSpPr>
+          <p:cNvPr id="4" name="Content Placeholder 3">
+            <a:extLst>
+              <a:ext uri="{FF2B5EF4-FFF2-40B4-BE49-F238E27FC236}">
+                <a16:creationId xmlns:a16="http://schemas.microsoft.com/office/drawing/2014/main" id="{E37210F3-70E7-4C7C-B18A-39F831E7C0B1}"/>
+              </a:ext>
+            </a:extLst>
+          </p:cNvPr>
+          <p:cNvSpPr>
+            <a:spLocks noGrp="1"/>
+          </p:cNvSpPr>
+          <p:nvPr>
+            <p:ph idx="1"/>
+          </p:nvPr>
+        </p:nvSpPr>
+        <p:spPr>
+          <a:xfrm>
+            <a:off x="1103312" y="1853248"/>
+            <a:ext cx="8946541" cy="4395151"/>
+          </a:xfrm>
+        </p:spPr>
+        <p:txBody>
+          <a:bodyPr/>
+          <a:lstStyle/>
+          <a:p>
+            <a:r>
+              <a:rPr lang="en-US">
+                <a:latin typeface="Arial" panose="020B0604020202020204" pitchFamily="34" charset="0"/>
+                <a:cs typeface="Arial" panose="020B0604020202020204" pitchFamily="34" charset="0"/>
+              </a:rPr>
+              <a:t>Bài 1: Yêu cầu người dùng nhập 3 chuỗi và lưu vào 3 biến kiểu chuỗi với tên tùy chọn. Sau đó nối 3 chuỗi lại với ký tự phân cách là "|". Sau đó in kết quả cuối cùng ra màn hình với định dạng như sau:</a:t>
+            </a:r>
+          </a:p>
+          <a:p>
+            <a:pPr lvl="1"/>
+            <a:r>
+              <a:rPr lang="en-US">
+                <a:latin typeface="Arial" panose="020B0604020202020204" pitchFamily="34" charset="0"/>
+                <a:cs typeface="Arial" panose="020B0604020202020204" pitchFamily="34" charset="0"/>
+              </a:rPr>
+              <a:t>Nội dung bạn vừa nhập là: &lt;Nội dung người dùng nhập sau khi nối xong&gt;</a:t>
+            </a:r>
+          </a:p>
+        </p:txBody>
+      </p:sp>
+    </p:spTree>
+    <p:extLst>
+      <p:ext uri="{BB962C8B-B14F-4D97-AF65-F5344CB8AC3E}">
+        <p14:creationId xmlns:p14="http://schemas.microsoft.com/office/powerpoint/2010/main" val="2588599630"/>
+      </p:ext>
+    </p:extLst>
+  </p:cSld>
+  <p:clrMapOvr>
+    <a:masterClrMapping/>
+  </p:clrMapOvr>
+</p:sld>
+</file>
+
 <file path=ppt/slides/slide3.xml><?xml version="1.0" encoding="utf-8"?>
 <p:sld xmlns:a="http://schemas.openxmlformats.org/drawingml/2006/main" xmlns:r="http://schemas.openxmlformats.org/officeDocument/2006/relationships" xmlns:p="http://schemas.openxmlformats.org/presentationml/2006/main">
   <p:cSld>
@@ -9172,17 +9188,7 @@
                 <a:latin typeface="Arial" panose="020B0604020202020204" pitchFamily="34" charset="0"/>
                 <a:cs typeface="Arial" panose="020B0604020202020204" pitchFamily="34" charset="0"/>
               </a:rPr>
-              <a:t>Bài 1: Yêu cầu người dùng nhập 3 chuỗi và lưu vào 3 biến kiểu chuỗi với tên tùy chọn. Sau đó nối 3 chuỗi lại với ký tự phân cách là "|". Sau đó in kết quả cuối cùng ra màn hình với định dạng như sau:</a:t>
-            </a:r>
-          </a:p>
-          <a:p>
-            <a:pPr lvl="1"/>
-            <a:r>
-              <a:rPr lang="en-US">
-                <a:latin typeface="Arial" panose="020B0604020202020204" pitchFamily="34" charset="0"/>
-                <a:cs typeface="Arial" panose="020B0604020202020204" pitchFamily="34" charset="0"/>
-              </a:rPr>
-              <a:t>Nội dung bạn vừa nhập là: &lt;Nội dung người dùng nhập sau khi nối xong&gt;</a:t>
+              <a:t>Bài 2: Yêu cầu người dùng nhập vào 2 chuỗi bất kỳ và so sánh (có phân biệt chữ hoa / thường) 2 chuỗi này có giống nhau hay không và in ra màn hình kết quả so sánh ra màn hình cho người dùng biết.</a:t>
             </a:r>
           </a:p>
         </p:txBody>
@@ -9190,7 +9196,7 @@
     </p:spTree>
     <p:extLst>
       <p:ext uri="{BB962C8B-B14F-4D97-AF65-F5344CB8AC3E}">
-        <p14:creationId xmlns:p14="http://schemas.microsoft.com/office/powerpoint/2010/main" val="2588599630"/>
+        <p14:creationId xmlns:p14="http://schemas.microsoft.com/office/powerpoint/2010/main" val="2526339723"/>
       </p:ext>
     </p:extLst>
   </p:cSld>
@@ -9279,7 +9285,7 @@
                 <a:latin typeface="Arial" panose="020B0604020202020204" pitchFamily="34" charset="0"/>
                 <a:cs typeface="Arial" panose="020B0604020202020204" pitchFamily="34" charset="0"/>
               </a:rPr>
-              <a:t>Bài 2: Yêu cầu người dùng nhập vào 2 chuỗi bất kỳ và so sánh (có phân biệt chữ hoa / thường) 2 chuỗi này có giống nhau hay không và in ra màn hình kết quả so sánh ra màn hình cho người dùng biết.</a:t>
+              <a:t>Bài 3: Yêu cầu người dùng nhập vào 2 chuỗi bất kỳ và so sánh (không phân biệt chữ hoa / thường) xem 2 chuỗi này có goống nhau hay không và in kết quả so sánh ra màn hình để thông báo cho người dùng biết.</a:t>
             </a:r>
           </a:p>
         </p:txBody>
@@ -9287,7 +9293,7 @@
     </p:spTree>
     <p:extLst>
       <p:ext uri="{BB962C8B-B14F-4D97-AF65-F5344CB8AC3E}">
-        <p14:creationId xmlns:p14="http://schemas.microsoft.com/office/powerpoint/2010/main" val="2526339723"/>
+        <p14:creationId xmlns:p14="http://schemas.microsoft.com/office/powerpoint/2010/main" val="3293474091"/>
       </p:ext>
     </p:extLst>
   </p:cSld>
@@ -9376,7 +9382,27 @@
                 <a:latin typeface="Arial" panose="020B0604020202020204" pitchFamily="34" charset="0"/>
                 <a:cs typeface="Arial" panose="020B0604020202020204" pitchFamily="34" charset="0"/>
               </a:rPr>
-              <a:t>Bài 3: Yêu cầu người dùng nhập vào 2 chuỗi bất kỳ và so sánh (không phân biệt chữ hoa / thường) xem 2 chuỗi này có goống nhau hay không và in kết quả so sánh ra màn hình để thông báo cho người dùng biết.</a:t>
+              <a:t>Bài 4: Yêu cầu người dùng nhập vào một chuỗi bất kỳ và hãy xuất ra màn hình thông báo về độ dài của chuỗi mà người dùng nhập theo định dạng như sau:</a:t>
+            </a:r>
+          </a:p>
+          <a:p>
+            <a:pPr lvl="1"/>
+            <a:r>
+              <a:rPr lang="en-US">
+                <a:latin typeface="Arial" panose="020B0604020202020204" pitchFamily="34" charset="0"/>
+                <a:cs typeface="Arial" panose="020B0604020202020204" pitchFamily="34" charset="0"/>
+              </a:rPr>
+              <a:t>Nội dung bạn đã nhập: &lt;Nội dung người dùng nhập&gt;</a:t>
+            </a:r>
+          </a:p>
+          <a:p>
+            <a:pPr lvl="1"/>
+            <a:r>
+              <a:rPr lang="en-US">
+                <a:latin typeface="Arial" panose="020B0604020202020204" pitchFamily="34" charset="0"/>
+                <a:cs typeface="Arial" panose="020B0604020202020204" pitchFamily="34" charset="0"/>
+              </a:rPr>
+              <a:t>Độ dài nội dung: &lt;Độ dài nội dung người dùng nhập&gt;</a:t>
             </a:r>
           </a:p>
         </p:txBody>
@@ -9384,7 +9410,7 @@
     </p:spTree>
     <p:extLst>
       <p:ext uri="{BB962C8B-B14F-4D97-AF65-F5344CB8AC3E}">
-        <p14:creationId xmlns:p14="http://schemas.microsoft.com/office/powerpoint/2010/main" val="3293474091"/>
+        <p14:creationId xmlns:p14="http://schemas.microsoft.com/office/powerpoint/2010/main" val="3207358187"/>
       </p:ext>
     </p:extLst>
   </p:cSld>
@@ -9473,7 +9499,7 @@
                 <a:latin typeface="Arial" panose="020B0604020202020204" pitchFamily="34" charset="0"/>
                 <a:cs typeface="Arial" panose="020B0604020202020204" pitchFamily="34" charset="0"/>
               </a:rPr>
-              <a:t>Bài 4: Yêu cầu người dùng nhập vào một chuỗi bất kỳ và hãy xuất ra màn hình thông báo về độ dài của chuỗi mà người dùng nhập theo định dạng như sau:</a:t>
+              <a:t>Bài 5: Yêu cầu người dùng nhập vào một chuỗi bất kỳ và sau đó lấy ký tự đầu tiên, ký tự ở giữa và ký tự cuối cùng trong chuỗi được nhập bởi người dùng và nối 3 ký tự này lại thành 1 chuỗi và in ra màn hình console.</a:t>
             </a:r>
           </a:p>
           <a:p>
@@ -9483,17 +9509,7 @@
                 <a:latin typeface="Arial" panose="020B0604020202020204" pitchFamily="34" charset="0"/>
                 <a:cs typeface="Arial" panose="020B0604020202020204" pitchFamily="34" charset="0"/>
               </a:rPr>
-              <a:t>Nội dung bạn đã nhập: &lt;Nội dung người dùng nhập&gt;</a:t>
-            </a:r>
-          </a:p>
-          <a:p>
-            <a:pPr lvl="1"/>
-            <a:r>
-              <a:rPr lang="en-US">
-                <a:latin typeface="Arial" panose="020B0604020202020204" pitchFamily="34" charset="0"/>
-                <a:cs typeface="Arial" panose="020B0604020202020204" pitchFamily="34" charset="0"/>
-              </a:rPr>
-              <a:t>Độ dài nội dung: &lt;Độ dài nội dung người dùng nhập&gt;</a:t>
+              <a:t>Lưu ý: Có trường hợp người dùng nhập rỗng, nhớ kiểm tra ngoại lệ.</a:t>
             </a:r>
           </a:p>
         </p:txBody>
@@ -9501,7 +9517,7 @@
     </p:spTree>
     <p:extLst>
       <p:ext uri="{BB962C8B-B14F-4D97-AF65-F5344CB8AC3E}">
-        <p14:creationId xmlns:p14="http://schemas.microsoft.com/office/powerpoint/2010/main" val="3207358187"/>
+        <p14:creationId xmlns:p14="http://schemas.microsoft.com/office/powerpoint/2010/main" val="2478845632"/>
       </p:ext>
     </p:extLst>
   </p:cSld>
@@ -9590,17 +9606,7 @@
                 <a:latin typeface="Arial" panose="020B0604020202020204" pitchFamily="34" charset="0"/>
                 <a:cs typeface="Arial" panose="020B0604020202020204" pitchFamily="34" charset="0"/>
               </a:rPr>
-              <a:t>Bài 5: Yêu cầu người dùng nhập vào một chuỗi bất kỳ và sau đó lấy ký tự đầu tiên, ký tự ở giữa và ký tự cuối cùng trong chuỗi được nhập bởi người dùng và nối 3 ký tự này lại thành 1 chuỗi và in ra màn hình console.</a:t>
-            </a:r>
-          </a:p>
-          <a:p>
-            <a:pPr lvl="1"/>
-            <a:r>
-              <a:rPr lang="en-US">
-                <a:latin typeface="Arial" panose="020B0604020202020204" pitchFamily="34" charset="0"/>
-                <a:cs typeface="Arial" panose="020B0604020202020204" pitchFamily="34" charset="0"/>
-              </a:rPr>
-              <a:t>Lưu ý: Có trường hợp người dùng nhập rỗng, nhớ kiểm tra ngoại lệ.</a:t>
+              <a:t>Bài 6: Yêu cầu người dùng nhập vào 2 chuỗi A và B. Sau đó hãy kiểm tra xem chuỗi B có phải là chuỗi bắt đầu của chuỗi A hay không ? Và in kết quả kiểm tra ra màn hình để thông báo cho người dùng biết.</a:t>
             </a:r>
           </a:p>
         </p:txBody>
@@ -9608,7 +9614,7 @@
     </p:spTree>
     <p:extLst>
       <p:ext uri="{BB962C8B-B14F-4D97-AF65-F5344CB8AC3E}">
-        <p14:creationId xmlns:p14="http://schemas.microsoft.com/office/powerpoint/2010/main" val="2478845632"/>
+        <p14:creationId xmlns:p14="http://schemas.microsoft.com/office/powerpoint/2010/main" val="92884160"/>
       </p:ext>
     </p:extLst>
   </p:cSld>
@@ -9697,7 +9703,7 @@
                 <a:latin typeface="Arial" panose="020B0604020202020204" pitchFamily="34" charset="0"/>
                 <a:cs typeface="Arial" panose="020B0604020202020204" pitchFamily="34" charset="0"/>
               </a:rPr>
-              <a:t>Bài 6: Yêu cầu người dùng nhập vào 2 chuỗi A và B. Sau đó hãy kiểm tra xem chuỗi B có phải là chuỗi bắt đầu của chuỗi A hay không ? Và in kết quả kiểm tra ra màn hình để thông báo cho người dùng biết.</a:t>
+              <a:t>Bài 7: Yêu cầu người dùng nhập vào 2 chuỗi A và B. Sau đó hãy kiểm tra xem chuỗi B có phải là chuỗi kết thúc của chuỗi A hay không ? Và in kết quả kiểm tra ra màn hình để thông báo cho người dùng biết.</a:t>
             </a:r>
           </a:p>
         </p:txBody>
@@ -9705,7 +9711,7 @@
     </p:spTree>
     <p:extLst>
       <p:ext uri="{BB962C8B-B14F-4D97-AF65-F5344CB8AC3E}">
-        <p14:creationId xmlns:p14="http://schemas.microsoft.com/office/powerpoint/2010/main" val="92884160"/>
+        <p14:creationId xmlns:p14="http://schemas.microsoft.com/office/powerpoint/2010/main" val="3569039309"/>
       </p:ext>
     </p:extLst>
   </p:cSld>
@@ -9794,7 +9800,17 @@
                 <a:latin typeface="Arial" panose="020B0604020202020204" pitchFamily="34" charset="0"/>
                 <a:cs typeface="Arial" panose="020B0604020202020204" pitchFamily="34" charset="0"/>
               </a:rPr>
-              <a:t>Bài 7: Yêu cầu người dùng nhập vào 2 chuỗi A và B. Sau đó hãy kiểm tra xem chuỗi B có phải là chuỗi kết thúc của chuỗi A hay không ? Và in kết quả kiểm tra ra màn hình để thông báo cho người dùng biết.</a:t>
+              <a:t>Bài 8: Yêu cầu người dùng nhập một câu chào hỏi và ngay sau khi người dùng nhập xong, hãy tiến hành kiểm tra nội dung người dùng đã nhập có thực sự là một câu chào hỏi hay không ?</a:t>
+            </a:r>
+          </a:p>
+          <a:p>
+            <a:pPr lvl="1"/>
+            <a:r>
+              <a:rPr lang="en-US">
+                <a:latin typeface="Arial" panose="020B0604020202020204" pitchFamily="34" charset="0"/>
+                <a:cs typeface="Arial" panose="020B0604020202020204" pitchFamily="34" charset="0"/>
+              </a:rPr>
+              <a:t>Một câu chào hỏi bao giờ cũng bắt đầu bằng câu "Xin chào".</a:t>
             </a:r>
           </a:p>
         </p:txBody>
@@ -9802,7 +9818,7 @@
     </p:spTree>
     <p:extLst>
       <p:ext uri="{BB962C8B-B14F-4D97-AF65-F5344CB8AC3E}">
-        <p14:creationId xmlns:p14="http://schemas.microsoft.com/office/powerpoint/2010/main" val="3569039309"/>
+        <p14:creationId xmlns:p14="http://schemas.microsoft.com/office/powerpoint/2010/main" val="3326451580"/>
       </p:ext>
     </p:extLst>
   </p:cSld>
@@ -9891,7 +9907,7 @@
                 <a:latin typeface="Arial" panose="020B0604020202020204" pitchFamily="34" charset="0"/>
                 <a:cs typeface="Arial" panose="020B0604020202020204" pitchFamily="34" charset="0"/>
               </a:rPr>
-              <a:t>Bài 8: Yêu cầu người dùng nhập một câu chào hỏi và ngay sau khi người dùng nhập xong, hãy tiến hành kiểm tra nội dung người dùng đã nhập có thực sự là một câu chào hỏi hay không ?</a:t>
+              <a:t>Bài 9: Yêu cầu người dùng nhập một lời tạm biệt và ngay sau khi người dùng nhập xong, hãy tiến hành kiểm tra nội dung người dùng đã nhập có thực sự là lời tạm biệt hay không ?</a:t>
             </a:r>
           </a:p>
           <a:p>
@@ -9901,7 +9917,7 @@
                 <a:latin typeface="Arial" panose="020B0604020202020204" pitchFamily="34" charset="0"/>
                 <a:cs typeface="Arial" panose="020B0604020202020204" pitchFamily="34" charset="0"/>
               </a:rPr>
-              <a:t>Một câu chào hỏi bao giờ cũng bắt đầu bằng câu "Xin chào".</a:t>
+              <a:t>Một câu chào hỏi bao giờ cũng kết thúc bằng câu "hẹn gặp lại".</a:t>
             </a:r>
           </a:p>
         </p:txBody>
@@ -9909,7 +9925,7 @@
     </p:spTree>
     <p:extLst>
       <p:ext uri="{BB962C8B-B14F-4D97-AF65-F5344CB8AC3E}">
-        <p14:creationId xmlns:p14="http://schemas.microsoft.com/office/powerpoint/2010/main" val="3326451580"/>
+        <p14:creationId xmlns:p14="http://schemas.microsoft.com/office/powerpoint/2010/main" val="2265312171"/>
       </p:ext>
     </p:extLst>
   </p:cSld>
@@ -9998,17 +10014,7 @@
                 <a:latin typeface="Arial" panose="020B0604020202020204" pitchFamily="34" charset="0"/>
                 <a:cs typeface="Arial" panose="020B0604020202020204" pitchFamily="34" charset="0"/>
               </a:rPr>
-              <a:t>Bài 9: Yêu cầu người dùng nhập một lời tạm biệt và ngay sau khi người dùng nhập xong, hãy tiến hành kiểm tra nội dung người dùng đã nhập có thực sự là lời tạm biệt hay không ?</a:t>
-            </a:r>
-          </a:p>
-          <a:p>
-            <a:pPr lvl="1"/>
-            <a:r>
-              <a:rPr lang="en-US">
-                <a:latin typeface="Arial" panose="020B0604020202020204" pitchFamily="34" charset="0"/>
-                <a:cs typeface="Arial" panose="020B0604020202020204" pitchFamily="34" charset="0"/>
-              </a:rPr>
-              <a:t>Một câu chào hỏi bao giờ cũng kết thúc bằng câu "hẹn gặp lại".</a:t>
+              <a:t>Bài 10: Yêu cầu người dùng nhập 2 chuỗi A và B. Sau đó hãy kiểm tra chuỗi B có phải là chuỗi con của chuỗi A hay không ? Hay nói cách khác, chuỗi B có chưa trong A hay không ? Sau khi kiểm tra xong, hãy in kết quả kiểm tra ra màn hình để thông báo cho người dùng biết.</a:t>
             </a:r>
           </a:p>
         </p:txBody>
@@ -10016,7 +10022,7 @@
     </p:spTree>
     <p:extLst>
       <p:ext uri="{BB962C8B-B14F-4D97-AF65-F5344CB8AC3E}">
-        <p14:creationId xmlns:p14="http://schemas.microsoft.com/office/powerpoint/2010/main" val="2265312171"/>
+        <p14:creationId xmlns:p14="http://schemas.microsoft.com/office/powerpoint/2010/main" val="3926007051"/>
       </p:ext>
     </p:extLst>
   </p:cSld>
@@ -10105,7 +10111,27 @@
                 <a:latin typeface="Arial" panose="020B0604020202020204" pitchFamily="34" charset="0"/>
                 <a:cs typeface="Arial" panose="020B0604020202020204" pitchFamily="34" charset="0"/>
               </a:rPr>
-              <a:t>Bài 10: Yêu cầu người dùng nhập 2 chuỗi A và B. Sau đó hãy kiểm tra chuỗi B có phải là chuỗi con của chuỗi A hay không ? Hay nói cách khác, chuỗi B có chưa trong A hay không ? Sau khi kiểm tra xong, hãy in kết quả kiểm tra ra màn hình để thông báo cho người dùng biết.</a:t>
+              <a:t>Bài 11: Yêu cầu người dùng nhập họ và tên và sau đó tạo một chuỗi theo định dạng được cung cấp bên dưới. Sau khi tạo xong, hãy in chuỗi đó ra màn hình như một lời chào tới người dùng.</a:t>
+            </a:r>
+          </a:p>
+          <a:p>
+            <a:pPr lvl="1"/>
+            <a:r>
+              <a:rPr lang="en-US">
+                <a:latin typeface="Arial" panose="020B0604020202020204" pitchFamily="34" charset="0"/>
+                <a:cs typeface="Arial" panose="020B0604020202020204" pitchFamily="34" charset="0"/>
+              </a:rPr>
+              <a:t>Lưu ý: Nếu không nhập gì thì không cần phải chào.</a:t>
+            </a:r>
+          </a:p>
+          <a:p>
+            <a:pPr lvl="1"/>
+            <a:r>
+              <a:rPr lang="en-US">
+                <a:latin typeface="Arial" panose="020B0604020202020204" pitchFamily="34" charset="0"/>
+                <a:cs typeface="Arial" panose="020B0604020202020204" pitchFamily="34" charset="0"/>
+              </a:rPr>
+              <a:t>Định dạng câu chào: Xin chào, &lt;Họ và tên&gt;</a:t>
             </a:r>
           </a:p>
         </p:txBody>
@@ -10113,7 +10139,7 @@
     </p:spTree>
     <p:extLst>
       <p:ext uri="{BB962C8B-B14F-4D97-AF65-F5344CB8AC3E}">
-        <p14:creationId xmlns:p14="http://schemas.microsoft.com/office/powerpoint/2010/main" val="3926007051"/>
+        <p14:creationId xmlns:p14="http://schemas.microsoft.com/office/powerpoint/2010/main" val="695244943"/>
       </p:ext>
     </p:extLst>
   </p:cSld>
@@ -10337,7 +10363,7 @@
                 <a:latin typeface="Arial" panose="020B0604020202020204" pitchFamily="34" charset="0"/>
                 <a:cs typeface="Arial" panose="020B0604020202020204" pitchFamily="34" charset="0"/>
               </a:rPr>
-              <a:t>Bài 11: Yêu cầu người dùng nhập họ và tên và sau đó tạo một chuỗi theo định dạng được cung cấp bên dưới. Sau khi tạo xong, hãy in chuỗi đó ra màn hình như một lời chào tới người dùng.</a:t>
+              <a:t>Bài 12: Yêu cầu người dùng nhập vào một con số nguyên bất kỳ và sau đó tạo một chuỗi định dạng như được cung cấp ở dưới và xuất ra màn hình.</a:t>
             </a:r>
           </a:p>
           <a:p>
@@ -10347,17 +10373,7 @@
                 <a:latin typeface="Arial" panose="020B0604020202020204" pitchFamily="34" charset="0"/>
                 <a:cs typeface="Arial" panose="020B0604020202020204" pitchFamily="34" charset="0"/>
               </a:rPr>
-              <a:t>Lưu ý: Nếu không nhập gì thì không cần phải chào.</a:t>
-            </a:r>
-          </a:p>
-          <a:p>
-            <a:pPr lvl="1"/>
-            <a:r>
-              <a:rPr lang="en-US">
-                <a:latin typeface="Arial" panose="020B0604020202020204" pitchFamily="34" charset="0"/>
-                <a:cs typeface="Arial" panose="020B0604020202020204" pitchFamily="34" charset="0"/>
-              </a:rPr>
-              <a:t>Định dạng câu chào: Xin chào, &lt;Họ và tên&gt;</a:t>
+              <a:t>Định dạng: Số nguyên bạn vừa nhập: &lt;Số nguyên hiển thị ít nhất 6 số, có phân cách hàng nghìn, có chèn 0 ở đầu nếu không đủ 6 số&gt;</a:t>
             </a:r>
           </a:p>
         </p:txBody>
@@ -10365,7 +10381,7 @@
     </p:spTree>
     <p:extLst>
       <p:ext uri="{BB962C8B-B14F-4D97-AF65-F5344CB8AC3E}">
-        <p14:creationId xmlns:p14="http://schemas.microsoft.com/office/powerpoint/2010/main" val="695244943"/>
+        <p14:creationId xmlns:p14="http://schemas.microsoft.com/office/powerpoint/2010/main" val="645769369"/>
       </p:ext>
     </p:extLst>
   </p:cSld>
@@ -10454,7 +10470,7 @@
                 <a:latin typeface="Arial" panose="020B0604020202020204" pitchFamily="34" charset="0"/>
                 <a:cs typeface="Arial" panose="020B0604020202020204" pitchFamily="34" charset="0"/>
               </a:rPr>
-              <a:t>Bài 12: Yêu cầu người dùng nhập vào một con số nguyên bất kỳ và sau đó tạo một chuỗi định dạng như được cung cấp ở dưới và xuất ra màn hình.</a:t>
+              <a:t>Bài 13: Yêu cầu người dùng nhập vào 3 con số thực A, B và C. Sau đó thực hiện phép chia A cho B sau đó dùng kết quả từ phép chia nhân cho C làm kết quả cuối cùng. Sau khi có kết quả cuối cùng, hãy tạo chuỗi định dạng và xuất ra màn hình theo định dạng được cung cấp ở dưới.</a:t>
             </a:r>
           </a:p>
           <a:p>
@@ -10464,7 +10480,7 @@
                 <a:latin typeface="Arial" panose="020B0604020202020204" pitchFamily="34" charset="0"/>
                 <a:cs typeface="Arial" panose="020B0604020202020204" pitchFamily="34" charset="0"/>
               </a:rPr>
-              <a:t>Định dạng: Số nguyên bạn vừa nhập: &lt;Số nguyên hiển thị ít nhất 6 số, có phân cách hàng nghìn, có chèn 0 ở đầu nếu không đủ 6 số&gt;</a:t>
+              <a:t>Định dạng: Kết qua: &lt;Kết quả, hiển thị tối đa 3 số sau dấu .&gt;</a:t>
             </a:r>
           </a:p>
         </p:txBody>
@@ -10472,7 +10488,7 @@
     </p:spTree>
     <p:extLst>
       <p:ext uri="{BB962C8B-B14F-4D97-AF65-F5344CB8AC3E}">
-        <p14:creationId xmlns:p14="http://schemas.microsoft.com/office/powerpoint/2010/main" val="645769369"/>
+        <p14:creationId xmlns:p14="http://schemas.microsoft.com/office/powerpoint/2010/main" val="4075533102"/>
       </p:ext>
     </p:extLst>
   </p:cSld>
@@ -10561,17 +10577,7 @@
                 <a:latin typeface="Arial" panose="020B0604020202020204" pitchFamily="34" charset="0"/>
                 <a:cs typeface="Arial" panose="020B0604020202020204" pitchFamily="34" charset="0"/>
               </a:rPr>
-              <a:t>Bài 13: Yêu cầu người dùng nhập vào 3 con số thực A, B và C. Sau đó thực hiện phép chia A cho B sau đó dùng kết quả từ phép chia nhân cho C làm kết quả cuối cùng. Sau khi có kết quả cuối cùng, hãy tạo chuỗi định dạng và xuất ra màn hình theo định dạng được cung cấp ở dưới.</a:t>
-            </a:r>
-          </a:p>
-          <a:p>
-            <a:pPr lvl="1"/>
-            <a:r>
-              <a:rPr lang="en-US">
-                <a:latin typeface="Arial" panose="020B0604020202020204" pitchFamily="34" charset="0"/>
-                <a:cs typeface="Arial" panose="020B0604020202020204" pitchFamily="34" charset="0"/>
-              </a:rPr>
-              <a:t>Định dạng: Kết qua: &lt;Kết quả, hiển thị tối đa 3 số sau dấu .&gt;</a:t>
+              <a:t>Bài 14: Yêu cầu người dùng nhập vào 2 chuỗi A và B, hãy tìm kiếm vị trí bắt đầu của chuỗi B đầu tiên trong chuỗi A và hãy in ra màn hình sau khi tìm thấy.</a:t>
             </a:r>
           </a:p>
         </p:txBody>
@@ -10579,7 +10585,7 @@
     </p:spTree>
     <p:extLst>
       <p:ext uri="{BB962C8B-B14F-4D97-AF65-F5344CB8AC3E}">
-        <p14:creationId xmlns:p14="http://schemas.microsoft.com/office/powerpoint/2010/main" val="4075533102"/>
+        <p14:creationId xmlns:p14="http://schemas.microsoft.com/office/powerpoint/2010/main" val="1722982663"/>
       </p:ext>
     </p:extLst>
   </p:cSld>
@@ -10668,7 +10674,7 @@
                 <a:latin typeface="Arial" panose="020B0604020202020204" pitchFamily="34" charset="0"/>
                 <a:cs typeface="Arial" panose="020B0604020202020204" pitchFamily="34" charset="0"/>
               </a:rPr>
-              <a:t>Bài 14: Yêu cầu người dùng nhập vào 2 chuỗi A và B, hãy tìm kiếm vị trí bắt đầu của chuỗi B đầu tiên trong chuỗi A và hãy in ra màn hình sau khi tìm thấy.</a:t>
+              <a:t>Bài 15: Yêu cầu người dùng nhập vào 2 chuỗi A và B, hãy tìm kiếm vị trí bắt đầu của chuỗi B cuối cùng trong chuỗi A và hãy in ra màn hình sau khi tìm thấy.</a:t>
             </a:r>
           </a:p>
         </p:txBody>
@@ -10676,7 +10682,7 @@
     </p:spTree>
     <p:extLst>
       <p:ext uri="{BB962C8B-B14F-4D97-AF65-F5344CB8AC3E}">
-        <p14:creationId xmlns:p14="http://schemas.microsoft.com/office/powerpoint/2010/main" val="1722982663"/>
+        <p14:creationId xmlns:p14="http://schemas.microsoft.com/office/powerpoint/2010/main" val="314954568"/>
       </p:ext>
     </p:extLst>
   </p:cSld>
@@ -10765,7 +10771,27 @@
                 <a:latin typeface="Arial" panose="020B0604020202020204" pitchFamily="34" charset="0"/>
                 <a:cs typeface="Arial" panose="020B0604020202020204" pitchFamily="34" charset="0"/>
               </a:rPr>
-              <a:t>Bài 15: Yêu cầu người dùng nhập vào 2 chuỗi A và B, hãy tìm kiếm vị trí bắt đầu của chuỗi B cuối cùng trong chuỗi A và hãy in ra màn hình sau khi tìm thấy.</a:t>
+              <a:t>Bài 16: Yêu cầu người dùng nhập vào một chuỗi bất kỳ và thực hiện in các thông tin sau ra màn hình và theo định dạng được cung cấp bên dưới đây.</a:t>
+            </a:r>
+          </a:p>
+          <a:p>
+            <a:pPr lvl="1"/>
+            <a:r>
+              <a:rPr lang="en-US">
+                <a:latin typeface="Arial" panose="020B0604020202020204" pitchFamily="34" charset="0"/>
+                <a:cs typeface="Arial" panose="020B0604020202020204" pitchFamily="34" charset="0"/>
+              </a:rPr>
+              <a:t>Nội dung bạn đã nhập: &lt;Nội dung người dùng nhập&gt;</a:t>
+            </a:r>
+          </a:p>
+          <a:p>
+            <a:pPr lvl="1"/>
+            <a:r>
+              <a:rPr lang="en-US">
+                <a:latin typeface="Arial" panose="020B0604020202020204" pitchFamily="34" charset="0"/>
+                <a:cs typeface="Arial" panose="020B0604020202020204" pitchFamily="34" charset="0"/>
+              </a:rPr>
+              <a:t>Nội dung bạn nhập là rỗng ? &lt;Kết quả kiểm tra&gt;</a:t>
             </a:r>
           </a:p>
         </p:txBody>
@@ -10773,7 +10799,7 @@
     </p:spTree>
     <p:extLst>
       <p:ext uri="{BB962C8B-B14F-4D97-AF65-F5344CB8AC3E}">
-        <p14:creationId xmlns:p14="http://schemas.microsoft.com/office/powerpoint/2010/main" val="314954568"/>
+        <p14:creationId xmlns:p14="http://schemas.microsoft.com/office/powerpoint/2010/main" val="2143343680"/>
       </p:ext>
     </p:extLst>
   </p:cSld>
@@ -10862,7 +10888,7 @@
                 <a:latin typeface="Arial" panose="020B0604020202020204" pitchFamily="34" charset="0"/>
                 <a:cs typeface="Arial" panose="020B0604020202020204" pitchFamily="34" charset="0"/>
               </a:rPr>
-              <a:t>Bài 16: Yêu cầu người dùng nhập vào một chuỗi bất kỳ và thực hiện in các thông tin sau ra màn hình và theo định dạng được cung cấp bên dưới đây.</a:t>
+              <a:t>Bài 17: Yêu cầu người dùng nhập 3 chuỗi A, B và C, sau đó hãy thay thế chuỗi B đầu tiên được tìm thấy trong chuỗi A thành chuỗi C. Va sau đó hãy in kết quả ra màn hình theo định dạng:</a:t>
             </a:r>
           </a:p>
           <a:p>
@@ -10872,17 +10898,7 @@
                 <a:latin typeface="Arial" panose="020B0604020202020204" pitchFamily="34" charset="0"/>
                 <a:cs typeface="Arial" panose="020B0604020202020204" pitchFamily="34" charset="0"/>
               </a:rPr>
-              <a:t>Nội dung bạn đã nhập: &lt;Nội dung người dùng nhập&gt;</a:t>
-            </a:r>
-          </a:p>
-          <a:p>
-            <a:pPr lvl="1"/>
-            <a:r>
-              <a:rPr lang="en-US">
-                <a:latin typeface="Arial" panose="020B0604020202020204" pitchFamily="34" charset="0"/>
-                <a:cs typeface="Arial" panose="020B0604020202020204" pitchFamily="34" charset="0"/>
-              </a:rPr>
-              <a:t>Nội dung bạn nhập là rỗng ? &lt;Kết quả kiểm tra&gt;</a:t>
+              <a:t>Kết quả: &lt;Chuỗi A sau khi thay B bằng C&gt;</a:t>
             </a:r>
           </a:p>
         </p:txBody>
@@ -10890,7 +10906,7 @@
     </p:spTree>
     <p:extLst>
       <p:ext uri="{BB962C8B-B14F-4D97-AF65-F5344CB8AC3E}">
-        <p14:creationId xmlns:p14="http://schemas.microsoft.com/office/powerpoint/2010/main" val="2143343680"/>
+        <p14:creationId xmlns:p14="http://schemas.microsoft.com/office/powerpoint/2010/main" val="169136518"/>
       </p:ext>
     </p:extLst>
   </p:cSld>
@@ -10979,7 +10995,7 @@
                 <a:latin typeface="Arial" panose="020B0604020202020204" pitchFamily="34" charset="0"/>
                 <a:cs typeface="Arial" panose="020B0604020202020204" pitchFamily="34" charset="0"/>
               </a:rPr>
-              <a:t>Bài 17: Yêu cầu người dùng nhập 3 chuỗi A, B và C, sau đó hãy thay thế chuỗi B đầu tiên được tìm thấy trong chuỗi A thành chuỗi C. Va sau đó hãy in kết quả ra màn hình theo định dạng:</a:t>
+              <a:t>Bài 18: Yêu cầu người dùng nhập 3 chuỗi A, B và C, sau đó hãy thay thế tất cả chuỗi B được tìm thấy trong chuỗi A thành chuỗi C. Va sau đó hãy in kết quả ra màn hình theo định dạng:</a:t>
             </a:r>
           </a:p>
           <a:p>
@@ -10997,7 +11013,7 @@
     </p:spTree>
     <p:extLst>
       <p:ext uri="{BB962C8B-B14F-4D97-AF65-F5344CB8AC3E}">
-        <p14:creationId xmlns:p14="http://schemas.microsoft.com/office/powerpoint/2010/main" val="169136518"/>
+        <p14:creationId xmlns:p14="http://schemas.microsoft.com/office/powerpoint/2010/main" val="4294416600"/>
       </p:ext>
     </p:extLst>
   </p:cSld>
@@ -11086,7 +11102,7 @@
                 <a:latin typeface="Arial" panose="020B0604020202020204" pitchFamily="34" charset="0"/>
                 <a:cs typeface="Arial" panose="020B0604020202020204" pitchFamily="34" charset="0"/>
               </a:rPr>
-              <a:t>Bài 18: Yêu cầu người dùng nhập 3 chuỗi A, B và C, sau đó hãy thay thế tất cả chuỗi B được tìm thấy trong chuỗi A thành chuỗi C. Va sau đó hãy in kết quả ra màn hình theo định dạng:</a:t>
+              <a:t>Bài 19: Yêu cầu người dùng nhập một nội dung bất kỳ và sau đó hãy tách nhỏ nội dung người dùng nhập thông qua dấu phân cách là dấu ".". Sau đó hãy in tất cả những chuỗi nhỏ sau khi tách xong.</a:t>
             </a:r>
           </a:p>
           <a:p>
@@ -11096,7 +11112,7 @@
                 <a:latin typeface="Arial" panose="020B0604020202020204" pitchFamily="34" charset="0"/>
                 <a:cs typeface="Arial" panose="020B0604020202020204" pitchFamily="34" charset="0"/>
               </a:rPr>
-              <a:t>Kết quả: &lt;Chuỗi A sau khi thay B bằng C&gt;</a:t>
+              <a:t>Cách duyệt mảng đã có ví dụ trong phần nội dung về tách chuỗi, có thể quay về coi.</a:t>
             </a:r>
           </a:p>
         </p:txBody>
@@ -11104,7 +11120,7 @@
     </p:spTree>
     <p:extLst>
       <p:ext uri="{BB962C8B-B14F-4D97-AF65-F5344CB8AC3E}">
-        <p14:creationId xmlns:p14="http://schemas.microsoft.com/office/powerpoint/2010/main" val="4294416600"/>
+        <p14:creationId xmlns:p14="http://schemas.microsoft.com/office/powerpoint/2010/main" val="1586054755"/>
       </p:ext>
     </p:extLst>
   </p:cSld>
@@ -11193,7 +11209,7 @@
                 <a:latin typeface="Arial" panose="020B0604020202020204" pitchFamily="34" charset="0"/>
                 <a:cs typeface="Arial" panose="020B0604020202020204" pitchFamily="34" charset="0"/>
               </a:rPr>
-              <a:t>Bài 19: Yêu cầu người dùng nhập một nội dung bất kỳ và sau đó hãy tách nhỏ nội dung người dùng nhập thông qua dấu phân cách là dấu ".". Sau đó hãy in tất cả những chuỗi nhỏ sau khi tách xong.</a:t>
+              <a:t>Bài 20: Yêu cầu người dùng nhập nội dung bất kỳ và sau khi người dùng nhập xong, hãy chuyển đổi nội dung đó sang dạng viết hoa toàn bộ ký tự và in ra màn hình kết quả với định dạng như sau:</a:t>
             </a:r>
           </a:p>
           <a:p>
@@ -11203,7 +11219,7 @@
                 <a:latin typeface="Arial" panose="020B0604020202020204" pitchFamily="34" charset="0"/>
                 <a:cs typeface="Arial" panose="020B0604020202020204" pitchFamily="34" charset="0"/>
               </a:rPr>
-              <a:t>Cách duyệt mảng đã có ví dụ trong phần nội dung về tách chuỗi, có thể quay về coi.</a:t>
+              <a:t>Nội dung của bạn khi viết hoa: &lt;Nội dung sau khi chuyển đổi viết hoa&gt;</a:t>
             </a:r>
           </a:p>
         </p:txBody>
@@ -11211,7 +11227,7 @@
     </p:spTree>
     <p:extLst>
       <p:ext uri="{BB962C8B-B14F-4D97-AF65-F5344CB8AC3E}">
-        <p14:creationId xmlns:p14="http://schemas.microsoft.com/office/powerpoint/2010/main" val="1586054755"/>
+        <p14:creationId xmlns:p14="http://schemas.microsoft.com/office/powerpoint/2010/main" val="2924622377"/>
       </p:ext>
     </p:extLst>
   </p:cSld>
@@ -11300,7 +11316,7 @@
                 <a:latin typeface="Arial" panose="020B0604020202020204" pitchFamily="34" charset="0"/>
                 <a:cs typeface="Arial" panose="020B0604020202020204" pitchFamily="34" charset="0"/>
               </a:rPr>
-              <a:t>Bài 20: Yêu cầu người dùng nhập nội dung bất kỳ và sau khi người dùng nhập xong, hãy chuyển đổi nội dung đó sang dạng viết hoa toàn bộ ký tự và in ra màn hình kết quả với định dạng như sau:</a:t>
+              <a:t>Bài 21: Yêu cầu người dùng nhập nội dung bất kỳ và sau khi người dùng nhập xong, hãy chuyển đổi nội dung đó sang dạng viết thường toàn bộ ký tự và in ra màn hình kết quả với định dạng như sau:</a:t>
             </a:r>
           </a:p>
           <a:p>
@@ -11310,7 +11326,7 @@
                 <a:latin typeface="Arial" panose="020B0604020202020204" pitchFamily="34" charset="0"/>
                 <a:cs typeface="Arial" panose="020B0604020202020204" pitchFamily="34" charset="0"/>
               </a:rPr>
-              <a:t>Nội dung của bạn khi viết hoa: &lt;Nội dung sau khi chuyển đổi viết hoa&gt;</a:t>
+              <a:t>Nội dung của bạn khi viết thường: &lt;Nội dung sau khi chuyển đổi viết thường&gt;</a:t>
             </a:r>
           </a:p>
         </p:txBody>
@@ -11318,7 +11334,7 @@
     </p:spTree>
     <p:extLst>
       <p:ext uri="{BB962C8B-B14F-4D97-AF65-F5344CB8AC3E}">
-        <p14:creationId xmlns:p14="http://schemas.microsoft.com/office/powerpoint/2010/main" val="2924622377"/>
+        <p14:creationId xmlns:p14="http://schemas.microsoft.com/office/powerpoint/2010/main" val="258700359"/>
       </p:ext>
     </p:extLst>
   </p:cSld>
@@ -11409,113 +11425,6 @@
     <p:extLst>
       <p:ext uri="{BB962C8B-B14F-4D97-AF65-F5344CB8AC3E}">
         <p14:creationId xmlns:p14="http://schemas.microsoft.com/office/powerpoint/2010/main" val="2805689708"/>
-      </p:ext>
-    </p:extLst>
-  </p:cSld>
-  <p:clrMapOvr>
-    <a:masterClrMapping/>
-  </p:clrMapOvr>
-</p:sld>
-</file>
-
-<file path=ppt/slides/slide50.xml><?xml version="1.0" encoding="utf-8"?>
-<p:sld xmlns:a="http://schemas.openxmlformats.org/drawingml/2006/main" xmlns:r="http://schemas.openxmlformats.org/officeDocument/2006/relationships" xmlns:p="http://schemas.openxmlformats.org/presentationml/2006/main">
-  <p:cSld>
-    <p:spTree>
-      <p:nvGrpSpPr>
-        <p:cNvPr id="1" name=""/>
-        <p:cNvGrpSpPr/>
-        <p:nvPr/>
-      </p:nvGrpSpPr>
-      <p:grpSpPr>
-        <a:xfrm>
-          <a:off x="0" y="0"/>
-          <a:ext cx="0" cy="0"/>
-          <a:chOff x="0" y="0"/>
-          <a:chExt cx="0" cy="0"/>
-        </a:xfrm>
-      </p:grpSpPr>
-      <p:sp>
-        <p:nvSpPr>
-          <p:cNvPr id="2" name="Title 1">
-            <a:extLst>
-              <a:ext uri="{FF2B5EF4-FFF2-40B4-BE49-F238E27FC236}">
-                <a16:creationId xmlns:a16="http://schemas.microsoft.com/office/drawing/2014/main" id="{14D7F595-0D8F-4FE6-A3EC-4557A1A457EB}"/>
-              </a:ext>
-            </a:extLst>
-          </p:cNvPr>
-          <p:cNvSpPr>
-            <a:spLocks noGrp="1"/>
-          </p:cNvSpPr>
-          <p:nvPr>
-            <p:ph type="title"/>
-          </p:nvPr>
-        </p:nvSpPr>
-        <p:spPr/>
-        <p:txBody>
-          <a:bodyPr/>
-          <a:lstStyle/>
-          <a:p>
-            <a:r>
-              <a:rPr lang="en-US">
-                <a:latin typeface="Arial" panose="020B0604020202020204" pitchFamily="34" charset="0"/>
-                <a:cs typeface="Arial" panose="020B0604020202020204" pitchFamily="34" charset="0"/>
-              </a:rPr>
-              <a:t>Bài tập thực hành</a:t>
-            </a:r>
-          </a:p>
-        </p:txBody>
-      </p:sp>
-      <p:sp>
-        <p:nvSpPr>
-          <p:cNvPr id="4" name="Content Placeholder 3">
-            <a:extLst>
-              <a:ext uri="{FF2B5EF4-FFF2-40B4-BE49-F238E27FC236}">
-                <a16:creationId xmlns:a16="http://schemas.microsoft.com/office/drawing/2014/main" id="{E37210F3-70E7-4C7C-B18A-39F831E7C0B1}"/>
-              </a:ext>
-            </a:extLst>
-          </p:cNvPr>
-          <p:cNvSpPr>
-            <a:spLocks noGrp="1"/>
-          </p:cNvSpPr>
-          <p:nvPr>
-            <p:ph idx="1"/>
-          </p:nvPr>
-        </p:nvSpPr>
-        <p:spPr>
-          <a:xfrm>
-            <a:off x="1103312" y="1853248"/>
-            <a:ext cx="8946541" cy="4395151"/>
-          </a:xfrm>
-        </p:spPr>
-        <p:txBody>
-          <a:bodyPr/>
-          <a:lstStyle/>
-          <a:p>
-            <a:r>
-              <a:rPr lang="en-US">
-                <a:latin typeface="Arial" panose="020B0604020202020204" pitchFamily="34" charset="0"/>
-                <a:cs typeface="Arial" panose="020B0604020202020204" pitchFamily="34" charset="0"/>
-              </a:rPr>
-              <a:t>Bài 21: Yêu cầu người dùng nhập nội dung bất kỳ và sau khi người dùng nhập xong, hãy chuyển đổi nội dung đó sang dạng viết thường toàn bộ ký tự và in ra màn hình kết quả với định dạng như sau:</a:t>
-            </a:r>
-          </a:p>
-          <a:p>
-            <a:pPr lvl="1"/>
-            <a:r>
-              <a:rPr lang="en-US">
-                <a:latin typeface="Arial" panose="020B0604020202020204" pitchFamily="34" charset="0"/>
-                <a:cs typeface="Arial" panose="020B0604020202020204" pitchFamily="34" charset="0"/>
-              </a:rPr>
-              <a:t>Nội dung của bạn khi viết thường: &lt;Nội dung sau khi chuyển đổi viết thường&gt;</a:t>
-            </a:r>
-          </a:p>
-        </p:txBody>
-      </p:sp>
-    </p:spTree>
-    <p:extLst>
-      <p:ext uri="{BB962C8B-B14F-4D97-AF65-F5344CB8AC3E}">
-        <p14:creationId xmlns:p14="http://schemas.microsoft.com/office/powerpoint/2010/main" val="258700359"/>
       </p:ext>
     </p:extLst>
   </p:cSld>

</xml_diff>